<commit_message>
luchen config and run
</commit_message>
<xml_diff>
--- a/cache/08aced46-45a2-48d7-993b-ed3fb5b32302/22_6.pptx
+++ b/cache/08aced46-45a2-48d7-993b-ed3fb5b32302/22_6.pptx
@@ -64,7 +64,7 @@
         <p:txBody>
           <a:bodyPr/>
           <a:p>
-            <a:fld id="{C2378883-7805-48E1-99DE-3C3136C75E4E}" type="slidenum">
+            <a:fld id="{FC8C7ECF-7566-4C4D-9D6B-876A588A6816}" type="slidenum">
               <a:t>&lt;#&gt;</a:t>
             </a:fld>
           </a:p>
@@ -252,7 +252,7 @@
         <p:txBody>
           <a:bodyPr/>
           <a:p>
-            <a:fld id="{30DD82E1-D620-4010-9CFB-384A14078983}" type="slidenum">
+            <a:fld id="{761C22F3-B652-40E4-9976-113C67B0F8B5}" type="slidenum">
               <a:t>&lt;#&gt;</a:t>
             </a:fld>
           </a:p>
@@ -508,7 +508,7 @@
         <p:txBody>
           <a:bodyPr/>
           <a:p>
-            <a:fld id="{179CEEEE-F64F-4DDF-AF08-BD52C1D01F99}" type="slidenum">
+            <a:fld id="{EF609DAB-992C-4666-8480-945890CEFC33}" type="slidenum">
               <a:t>&lt;#&gt;</a:t>
             </a:fld>
           </a:p>
@@ -832,7 +832,7 @@
         <p:txBody>
           <a:bodyPr/>
           <a:p>
-            <a:fld id="{851DC18A-FA6C-429F-B9F0-B6F8EA8A596F}" type="slidenum">
+            <a:fld id="{A349825A-C392-4BBA-A65D-7827A056A189}" type="slidenum">
               <a:t>&lt;#&gt;</a:t>
             </a:fld>
           </a:p>
@@ -989,7 +989,7 @@
         <p:txBody>
           <a:bodyPr/>
           <a:p>
-            <a:fld id="{ECA199C8-F19E-45BA-A73C-503F6EF13B75}" type="slidenum">
+            <a:fld id="{7AB5F547-ECEB-4DD5-9ED7-6AD9CE00AFD0}" type="slidenum">
               <a:t>&lt;#&gt;</a:t>
             </a:fld>
           </a:p>
@@ -1143,7 +1143,7 @@
         <p:txBody>
           <a:bodyPr/>
           <a:p>
-            <a:fld id="{CD4D8D06-10AD-489C-A074-38699234B92D}" type="slidenum">
+            <a:fld id="{5ECF20A7-A74F-4C74-94D6-27265BE07C48}" type="slidenum">
               <a:t>&lt;#&gt;</a:t>
             </a:fld>
           </a:p>
@@ -1331,7 +1331,7 @@
         <p:txBody>
           <a:bodyPr/>
           <a:p>
-            <a:fld id="{104FC2EB-7FC9-4DF7-9063-D2BDF6AA5EC1}" type="slidenum">
+            <a:fld id="{41A8CA6D-064C-4414-9872-BB5A0F9185E4}" type="slidenum">
               <a:t>&lt;#&gt;</a:t>
             </a:fld>
           </a:p>
@@ -1451,7 +1451,7 @@
         <p:txBody>
           <a:bodyPr/>
           <a:p>
-            <a:fld id="{49861F36-A1AC-4CE4-8C92-753F57611AA5}" type="slidenum">
+            <a:fld id="{79C9D5F1-C183-4B8F-9A1B-37ABCCA4F552}" type="slidenum">
               <a:t>&lt;#&gt;</a:t>
             </a:fld>
           </a:p>
@@ -1571,7 +1571,7 @@
         <p:txBody>
           <a:bodyPr/>
           <a:p>
-            <a:fld id="{18C973A9-BF2D-4E6B-82B7-ECDEB23F5FEE}" type="slidenum">
+            <a:fld id="{09DE09E1-E8B3-4751-98E4-43AE540134C2}" type="slidenum">
               <a:t>&lt;#&gt;</a:t>
             </a:fld>
           </a:p>
@@ -1793,7 +1793,7 @@
         <p:txBody>
           <a:bodyPr/>
           <a:p>
-            <a:fld id="{72F32B0E-04EE-4108-8691-4616C4F085DD}" type="slidenum">
+            <a:fld id="{AB22289D-7D49-496A-831D-668790650744}" type="slidenum">
               <a:t>&lt;#&gt;</a:t>
             </a:fld>
           </a:p>
@@ -2015,7 +2015,7 @@
         <p:txBody>
           <a:bodyPr/>
           <a:p>
-            <a:fld id="{770D6585-2578-41C9-9475-262E6AB3691D}" type="slidenum">
+            <a:fld id="{B22576CA-A7D7-4C2D-8CCF-922A3D5E8851}" type="slidenum">
               <a:t>&lt;#&gt;</a:t>
             </a:fld>
           </a:p>
@@ -2237,7 +2237,7 @@
         <p:txBody>
           <a:bodyPr/>
           <a:p>
-            <a:fld id="{97840B61-9420-4ED5-9F3D-4CC24AC713F9}" type="slidenum">
+            <a:fld id="{41F2B40D-7E4A-4D81-B8DB-BE5E4CCE7E31}" type="slidenum">
               <a:t>&lt;#&gt;</a:t>
             </a:fld>
           </a:p>
@@ -2398,7 +2398,7 @@
               </a:lnSpc>
               <a:buNone/>
             </a:pPr>
-            <a:fld id="{D07824B0-D65C-4EED-B8FD-405F98BA8807}" type="slidenum">
+            <a:fld id="{E1F53155-45A3-4175-A8E2-9E0567D9E76E}" type="slidenum">
               <a:rPr b="0" lang="en-US" sz="1200" spc="-1" strike="noStrike">
                 <a:solidFill>
                   <a:srgbClr val="8b8b8b"/>

</xml_diff>